<commit_message>
some ppt formatting changes
</commit_message>
<xml_diff>
--- a/Session02/Session2_Slides.pptx
+++ b/Session02/Session2_Slides.pptx
@@ -10771,7 +10771,7 @@
           </a:ln>
           <a:extLst>
             <a:ext uri="{C572A759-6A51-4108-AA02-DFA0A04FC94B}">
-              <ma14:wrappingTextBoxFlag xmlns="" xmlns:ma14="http://schemas.microsoft.com/office/mac/drawingml/2011/main" val="1"/>
+              <ma14:wrappingTextBoxFlag xmlns:ma14="http://schemas.microsoft.com/office/mac/drawingml/2011/main" xmlns="" val="1"/>
             </a:ext>
           </a:extLst>
         </p:spPr>
@@ -10810,7 +10810,7 @@
           </a:ln>
           <a:extLst>
             <a:ext uri="{C572A759-6A51-4108-AA02-DFA0A04FC94B}">
-              <ma14:wrappingTextBoxFlag xmlns="" xmlns:ma14="http://schemas.microsoft.com/office/mac/drawingml/2011/main" val="1"/>
+              <ma14:wrappingTextBoxFlag xmlns:ma14="http://schemas.microsoft.com/office/mac/drawingml/2011/main" xmlns="" val="1"/>
             </a:ext>
           </a:extLst>
         </p:spPr>
@@ -11831,7 +11831,7 @@
           </a:ln>
           <a:extLst>
             <a:ext uri="{C572A759-6A51-4108-AA02-DFA0A04FC94B}">
-              <ma14:wrappingTextBoxFlag xmlns:ma14="http://schemas.microsoft.com/office/mac/drawingml/2011/main" xmlns="" val="1"/>
+              <ma14:wrappingTextBoxFlag xmlns="" xmlns:ma14="http://schemas.microsoft.com/office/mac/drawingml/2011/main" val="1"/>
             </a:ext>
           </a:extLst>
         </p:spPr>
@@ -11870,7 +11870,7 @@
           </a:ln>
           <a:extLst>
             <a:ext uri="{C572A759-6A51-4108-AA02-DFA0A04FC94B}">
-              <ma14:wrappingTextBoxFlag xmlns:ma14="http://schemas.microsoft.com/office/mac/drawingml/2011/main" xmlns="" val="1"/>
+              <ma14:wrappingTextBoxFlag xmlns="" xmlns:ma14="http://schemas.microsoft.com/office/mac/drawingml/2011/main" val="1"/>
             </a:ext>
           </a:extLst>
         </p:spPr>
@@ -12923,7 +12923,7 @@
           </a:ln>
           <a:extLst>
             <a:ext uri="{C572A759-6A51-4108-AA02-DFA0A04FC94B}">
-              <ma14:wrappingTextBoxFlag xmlns="" xmlns:ma14="http://schemas.microsoft.com/office/mac/drawingml/2011/main" val="1"/>
+              <ma14:wrappingTextBoxFlag xmlns:ma14="http://schemas.microsoft.com/office/mac/drawingml/2011/main" xmlns="" val="1"/>
             </a:ext>
           </a:extLst>
         </p:spPr>
@@ -13043,7 +13043,7 @@
         </p:nvSpPr>
         <p:spPr>
           <a:xfrm>
-            <a:off x="8169423" y="8251885"/>
+            <a:off x="7192009" y="8288171"/>
             <a:ext cx="5406391" cy="1143001"/>
           </a:xfrm>
           <a:prstGeom prst="rect">
@@ -13054,7 +13054,7 @@
           </a:ln>
           <a:extLst>
             <a:ext uri="{C572A759-6A51-4108-AA02-DFA0A04FC94B}">
-              <ma14:wrappingTextBoxFlag xmlns="" xmlns:ma14="http://schemas.microsoft.com/office/mac/drawingml/2011/main" val="1"/>
+              <ma14:wrappingTextBoxFlag xmlns:ma14="http://schemas.microsoft.com/office/mac/drawingml/2011/main" xmlns="" val="1"/>
             </a:ext>
           </a:extLst>
         </p:spPr>
@@ -13247,7 +13247,7 @@
           </a:ln>
           <a:extLst>
             <a:ext uri="{C572A759-6A51-4108-AA02-DFA0A04FC94B}">
-              <ma14:wrappingTextBoxFlag xmlns="" xmlns:ma14="http://schemas.microsoft.com/office/mac/drawingml/2011/main" val="1"/>
+              <ma14:wrappingTextBoxFlag xmlns:ma14="http://schemas.microsoft.com/office/mac/drawingml/2011/main" xmlns="" val="1"/>
             </a:ext>
           </a:extLst>
         </p:spPr>
@@ -13403,7 +13403,7 @@
           </a:ln>
           <a:extLst>
             <a:ext uri="{C572A759-6A51-4108-AA02-DFA0A04FC94B}">
-              <ma14:wrappingTextBoxFlag xmlns="" xmlns:ma14="http://schemas.microsoft.com/office/mac/drawingml/2011/main" val="1"/>
+              <ma14:wrappingTextBoxFlag xmlns:ma14="http://schemas.microsoft.com/office/mac/drawingml/2011/main" xmlns="" val="1"/>
             </a:ext>
           </a:extLst>
         </p:spPr>
@@ -13517,7 +13517,7 @@
           </a:ln>
           <a:extLst>
             <a:ext uri="{C572A759-6A51-4108-AA02-DFA0A04FC94B}">
-              <ma14:wrappingTextBoxFlag xmlns="" xmlns:ma14="http://schemas.microsoft.com/office/mac/drawingml/2011/main" val="1"/>
+              <ma14:wrappingTextBoxFlag xmlns:ma14="http://schemas.microsoft.com/office/mac/drawingml/2011/main" xmlns="" val="1"/>
             </a:ext>
           </a:extLst>
         </p:spPr>
@@ -13887,7 +13887,7 @@
           </a:ln>
           <a:extLst>
             <a:ext uri="{C572A759-6A51-4108-AA02-DFA0A04FC94B}">
-              <ma14:wrappingTextBoxFlag xmlns="" xmlns:ma14="http://schemas.microsoft.com/office/mac/drawingml/2011/main" val="1"/>
+              <ma14:wrappingTextBoxFlag xmlns:ma14="http://schemas.microsoft.com/office/mac/drawingml/2011/main" xmlns="" val="1"/>
             </a:ext>
           </a:extLst>
         </p:spPr>
@@ -14001,7 +14001,7 @@
           </a:ln>
           <a:extLst>
             <a:ext uri="{C572A759-6A51-4108-AA02-DFA0A04FC94B}">
-              <ma14:wrappingTextBoxFlag xmlns="" xmlns:ma14="http://schemas.microsoft.com/office/mac/drawingml/2011/main" val="1"/>
+              <ma14:wrappingTextBoxFlag xmlns:ma14="http://schemas.microsoft.com/office/mac/drawingml/2011/main" xmlns="" val="1"/>
             </a:ext>
           </a:extLst>
         </p:spPr>
@@ -14558,7 +14558,7 @@
         </p:spPr>
         <p:txBody>
           <a:bodyPr anchor="t">
-            <a:normAutofit/>
+            <a:normAutofit fontScale="92500"/>
           </a:bodyPr>
           <a:lstStyle/>
           <a:p>
@@ -15215,7 +15215,7 @@
           </a:ln>
           <a:extLst>
             <a:ext uri="{C572A759-6A51-4108-AA02-DFA0A04FC94B}">
-              <ma14:wrappingTextBoxFlag xmlns="" xmlns:ma14="http://schemas.microsoft.com/office/mac/drawingml/2011/main" val="1"/>
+              <ma14:wrappingTextBoxFlag xmlns:ma14="http://schemas.microsoft.com/office/mac/drawingml/2011/main" xmlns="" val="1"/>
             </a:ext>
           </a:extLst>
         </p:spPr>
@@ -15351,7 +15351,7 @@
           </a:ln>
           <a:extLst>
             <a:ext uri="{C572A759-6A51-4108-AA02-DFA0A04FC94B}">
-              <ma14:wrappingTextBoxFlag xmlns="" xmlns:ma14="http://schemas.microsoft.com/office/mac/drawingml/2011/main" val="1"/>
+              <ma14:wrappingTextBoxFlag xmlns:ma14="http://schemas.microsoft.com/office/mac/drawingml/2011/main" xmlns="" val="1"/>
             </a:ext>
           </a:extLst>
         </p:spPr>
@@ -15465,7 +15465,7 @@
           </a:ln>
           <a:extLst>
             <a:ext uri="{C572A759-6A51-4108-AA02-DFA0A04FC94B}">
-              <ma14:wrappingTextBoxFlag xmlns="" xmlns:ma14="http://schemas.microsoft.com/office/mac/drawingml/2011/main" val="1"/>
+              <ma14:wrappingTextBoxFlag xmlns:ma14="http://schemas.microsoft.com/office/mac/drawingml/2011/main" xmlns="" val="1"/>
             </a:ext>
           </a:extLst>
         </p:spPr>
@@ -15813,7 +15813,7 @@
           </a:ln>
           <a:extLst>
             <a:ext uri="{C572A759-6A51-4108-AA02-DFA0A04FC94B}">
-              <ma14:wrappingTextBoxFlag xmlns="" xmlns:ma14="http://schemas.microsoft.com/office/mac/drawingml/2011/main" val="1"/>
+              <ma14:wrappingTextBoxFlag xmlns:ma14="http://schemas.microsoft.com/office/mac/drawingml/2011/main" xmlns="" val="1"/>
             </a:ext>
           </a:extLst>
         </p:spPr>
@@ -15930,7 +15930,7 @@
           </a:ln>
           <a:extLst>
             <a:ext uri="{C572A759-6A51-4108-AA02-DFA0A04FC94B}">
-              <ma14:wrappingTextBoxFlag xmlns="" xmlns:ma14="http://schemas.microsoft.com/office/mac/drawingml/2011/main" val="1"/>
+              <ma14:wrappingTextBoxFlag xmlns:ma14="http://schemas.microsoft.com/office/mac/drawingml/2011/main" xmlns="" val="1"/>
             </a:ext>
           </a:extLst>
         </p:spPr>
@@ -16341,7 +16341,7 @@
           </a:ln>
           <a:extLst>
             <a:ext uri="{C572A759-6A51-4108-AA02-DFA0A04FC94B}">
-              <ma14:wrappingTextBoxFlag xmlns="" xmlns:ma14="http://schemas.microsoft.com/office/mac/drawingml/2011/main" val="1"/>
+              <ma14:wrappingTextBoxFlag xmlns:ma14="http://schemas.microsoft.com/office/mac/drawingml/2011/main" xmlns="" val="1"/>
             </a:ext>
           </a:extLst>
         </p:spPr>
@@ -16390,7 +16390,7 @@
           </a:ln>
           <a:extLst>
             <a:ext uri="{C572A759-6A51-4108-AA02-DFA0A04FC94B}">
-              <ma14:wrappingTextBoxFlag xmlns="" xmlns:ma14="http://schemas.microsoft.com/office/mac/drawingml/2011/main" val="1"/>
+              <ma14:wrappingTextBoxFlag xmlns:ma14="http://schemas.microsoft.com/office/mac/drawingml/2011/main" xmlns="" val="1"/>
             </a:ext>
           </a:extLst>
         </p:spPr>
@@ -17062,7 +17062,7 @@
           </a:ln>
           <a:extLst>
             <a:ext uri="{C572A759-6A51-4108-AA02-DFA0A04FC94B}">
-              <ma14:wrappingTextBoxFlag xmlns:ma14="http://schemas.microsoft.com/office/mac/drawingml/2011/main" xmlns="" val="1"/>
+              <ma14:wrappingTextBoxFlag xmlns="" xmlns:ma14="http://schemas.microsoft.com/office/mac/drawingml/2011/main" val="1"/>
             </a:ext>
           </a:extLst>
         </p:spPr>
@@ -17171,7 +17171,7 @@
           </a:ln>
           <a:extLst>
             <a:ext uri="{C572A759-6A51-4108-AA02-DFA0A04FC94B}">
-              <ma14:wrappingTextBoxFlag xmlns:ma14="http://schemas.microsoft.com/office/mac/drawingml/2011/main" xmlns="" val="1"/>
+              <ma14:wrappingTextBoxFlag xmlns="" xmlns:ma14="http://schemas.microsoft.com/office/mac/drawingml/2011/main" val="1"/>
             </a:ext>
           </a:extLst>
         </p:spPr>
@@ -17263,7 +17263,7 @@
           </a:ln>
           <a:extLst>
             <a:ext uri="{C572A759-6A51-4108-AA02-DFA0A04FC94B}">
-              <ma14:wrappingTextBoxFlag xmlns:ma14="http://schemas.microsoft.com/office/mac/drawingml/2011/main" xmlns="" val="1"/>
+              <ma14:wrappingTextBoxFlag xmlns="" xmlns:ma14="http://schemas.microsoft.com/office/mac/drawingml/2011/main" val="1"/>
             </a:ext>
           </a:extLst>
         </p:spPr>
@@ -17372,7 +17372,7 @@
           </a:ln>
           <a:extLst>
             <a:ext uri="{C572A759-6A51-4108-AA02-DFA0A04FC94B}">
-              <ma14:wrappingTextBoxFlag xmlns:ma14="http://schemas.microsoft.com/office/mac/drawingml/2011/main" xmlns="" val="1"/>
+              <ma14:wrappingTextBoxFlag xmlns="" xmlns:ma14="http://schemas.microsoft.com/office/mac/drawingml/2011/main" val="1"/>
             </a:ext>
           </a:extLst>
         </p:spPr>
@@ -17481,7 +17481,7 @@
           </a:ln>
           <a:extLst>
             <a:ext uri="{C572A759-6A51-4108-AA02-DFA0A04FC94B}">
-              <ma14:wrappingTextBoxFlag xmlns:ma14="http://schemas.microsoft.com/office/mac/drawingml/2011/main" xmlns="" val="1"/>
+              <ma14:wrappingTextBoxFlag xmlns="" xmlns:ma14="http://schemas.microsoft.com/office/mac/drawingml/2011/main" val="1"/>
             </a:ext>
           </a:extLst>
         </p:spPr>
@@ -17573,7 +17573,7 @@
           </a:ln>
           <a:extLst>
             <a:ext uri="{C572A759-6A51-4108-AA02-DFA0A04FC94B}">
-              <ma14:wrappingTextBoxFlag xmlns:ma14="http://schemas.microsoft.com/office/mac/drawingml/2011/main" xmlns="" val="1"/>
+              <ma14:wrappingTextBoxFlag xmlns="" xmlns:ma14="http://schemas.microsoft.com/office/mac/drawingml/2011/main" val="1"/>
             </a:ext>
           </a:extLst>
         </p:spPr>
@@ -17682,7 +17682,7 @@
           </a:ln>
           <a:extLst>
             <a:ext uri="{C572A759-6A51-4108-AA02-DFA0A04FC94B}">
-              <ma14:wrappingTextBoxFlag xmlns:ma14="http://schemas.microsoft.com/office/mac/drawingml/2011/main" xmlns="" val="1"/>
+              <ma14:wrappingTextBoxFlag xmlns="" xmlns:ma14="http://schemas.microsoft.com/office/mac/drawingml/2011/main" val="1"/>
             </a:ext>
           </a:extLst>
         </p:spPr>
@@ -17774,7 +17774,7 @@
           </a:ln>
           <a:extLst>
             <a:ext uri="{C572A759-6A51-4108-AA02-DFA0A04FC94B}">
-              <ma14:wrappingTextBoxFlag xmlns:ma14="http://schemas.microsoft.com/office/mac/drawingml/2011/main" xmlns="" val="1"/>
+              <ma14:wrappingTextBoxFlag xmlns="" xmlns:ma14="http://schemas.microsoft.com/office/mac/drawingml/2011/main" val="1"/>
             </a:ext>
           </a:extLst>
         </p:spPr>
@@ -17883,7 +17883,7 @@
           </a:ln>
           <a:extLst>
             <a:ext uri="{C572A759-6A51-4108-AA02-DFA0A04FC94B}">
-              <ma14:wrappingTextBoxFlag xmlns:ma14="http://schemas.microsoft.com/office/mac/drawingml/2011/main" xmlns="" val="1"/>
+              <ma14:wrappingTextBoxFlag xmlns="" xmlns:ma14="http://schemas.microsoft.com/office/mac/drawingml/2011/main" val="1"/>
             </a:ext>
           </a:extLst>
         </p:spPr>
@@ -17975,7 +17975,7 @@
           </a:ln>
           <a:extLst>
             <a:ext uri="{C572A759-6A51-4108-AA02-DFA0A04FC94B}">
-              <ma14:wrappingTextBoxFlag xmlns:ma14="http://schemas.microsoft.com/office/mac/drawingml/2011/main" xmlns="" val="1"/>
+              <ma14:wrappingTextBoxFlag xmlns="" xmlns:ma14="http://schemas.microsoft.com/office/mac/drawingml/2011/main" val="1"/>
             </a:ext>
           </a:extLst>
         </p:spPr>
@@ -18084,7 +18084,7 @@
           </a:ln>
           <a:extLst>
             <a:ext uri="{C572A759-6A51-4108-AA02-DFA0A04FC94B}">
-              <ma14:wrappingTextBoxFlag xmlns="" xmlns:ma14="http://schemas.microsoft.com/office/mac/drawingml/2011/main" val="1"/>
+              <ma14:wrappingTextBoxFlag xmlns:ma14="http://schemas.microsoft.com/office/mac/drawingml/2011/main" xmlns="" val="1"/>
             </a:ext>
           </a:extLst>
         </p:spPr>
@@ -18710,7 +18710,7 @@
           </a:ln>
           <a:extLst>
             <a:ext uri="{C572A759-6A51-4108-AA02-DFA0A04FC94B}">
-              <ma14:wrappingTextBoxFlag xmlns="" xmlns:ma14="http://schemas.microsoft.com/office/mac/drawingml/2011/main" val="1"/>
+              <ma14:wrappingTextBoxFlag xmlns:ma14="http://schemas.microsoft.com/office/mac/drawingml/2011/main" xmlns="" val="1"/>
             </a:ext>
           </a:extLst>
         </p:spPr>
@@ -18866,7 +18866,7 @@
           </a:ln>
           <a:extLst>
             <a:ext uri="{C572A759-6A51-4108-AA02-DFA0A04FC94B}">
-              <ma14:wrappingTextBoxFlag xmlns="" xmlns:ma14="http://schemas.microsoft.com/office/mac/drawingml/2011/main" val="1"/>
+              <ma14:wrappingTextBoxFlag xmlns:ma14="http://schemas.microsoft.com/office/mac/drawingml/2011/main" xmlns="" val="1"/>
             </a:ext>
           </a:extLst>
         </p:spPr>
@@ -19022,7 +19022,7 @@
           </a:ln>
           <a:extLst>
             <a:ext uri="{C572A759-6A51-4108-AA02-DFA0A04FC94B}">
-              <ma14:wrappingTextBoxFlag xmlns="" xmlns:ma14="http://schemas.microsoft.com/office/mac/drawingml/2011/main" val="1"/>
+              <ma14:wrappingTextBoxFlag xmlns:ma14="http://schemas.microsoft.com/office/mac/drawingml/2011/main" xmlns="" val="1"/>
             </a:ext>
           </a:extLst>
         </p:spPr>
@@ -19177,7 +19177,7 @@
           </a:ln>
           <a:extLst>
             <a:ext uri="{C572A759-6A51-4108-AA02-DFA0A04FC94B}">
-              <ma14:wrappingTextBoxFlag xmlns="" xmlns:ma14="http://schemas.microsoft.com/office/mac/drawingml/2011/main" val="1"/>
+              <ma14:wrappingTextBoxFlag xmlns:ma14="http://schemas.microsoft.com/office/mac/drawingml/2011/main" xmlns="" val="1"/>
             </a:ext>
           </a:extLst>
         </p:spPr>
@@ -19297,7 +19297,7 @@
           </a:ln>
           <a:extLst>
             <a:ext uri="{C572A759-6A51-4108-AA02-DFA0A04FC94B}">
-              <ma14:wrappingTextBoxFlag xmlns="" xmlns:ma14="http://schemas.microsoft.com/office/mac/drawingml/2011/main" val="1"/>
+              <ma14:wrappingTextBoxFlag xmlns:ma14="http://schemas.microsoft.com/office/mac/drawingml/2011/main" xmlns="" val="1"/>
             </a:ext>
           </a:extLst>
         </p:spPr>
@@ -19428,7 +19428,7 @@
           </a:ln>
           <a:extLst>
             <a:ext uri="{C572A759-6A51-4108-AA02-DFA0A04FC94B}">
-              <ma14:wrappingTextBoxFlag xmlns="" xmlns:ma14="http://schemas.microsoft.com/office/mac/drawingml/2011/main" val="1"/>
+              <ma14:wrappingTextBoxFlag xmlns:ma14="http://schemas.microsoft.com/office/mac/drawingml/2011/main" xmlns="" val="1"/>
             </a:ext>
           </a:extLst>
         </p:spPr>
@@ -19543,7 +19543,7 @@
           </a:ln>
           <a:extLst>
             <a:ext uri="{C572A759-6A51-4108-AA02-DFA0A04FC94B}">
-              <ma14:wrappingTextBoxFlag xmlns="" xmlns:ma14="http://schemas.microsoft.com/office/mac/drawingml/2011/main" val="1"/>
+              <ma14:wrappingTextBoxFlag xmlns:ma14="http://schemas.microsoft.com/office/mac/drawingml/2011/main" xmlns="" val="1"/>
             </a:ext>
           </a:extLst>
         </p:spPr>

</xml_diff>